<commit_message>
Typo Error corrections in existing slides
</commit_message>
<xml_diff>
--- a/Slides-RPR/2019-H1-DAA-L13-Divide-Conquer-MaxMin.pptx
+++ b/Slides-RPR/2019-H1-DAA-L13-Divide-Conquer-MaxMin.pptx
@@ -4097,54 +4097,6 @@
             <a:r>
               <a:t>return (max, min)</a:t>
             </a:r>
-            <a:endParaRPr>
-              <a:latin typeface="Gill Sans MT"/>
-              <a:ea typeface="Gill Sans MT"/>
-              <a:cs typeface="Gill Sans MT"/>
-              <a:sym typeface="Gill Sans MT"/>
-            </a:endParaRPr>
-          </a:p>
-          <a:p>
-            <a:pPr lvl="1" marL="0" indent="228600">
-              <a:spcBef>
-                <a:spcPts val="100"/>
-              </a:spcBef>
-              <a:buSzTx/>
-              <a:buNone/>
-              <a:defRPr sz="2800">
-                <a:latin typeface="Courier New"/>
-                <a:ea typeface="Courier New"/>
-                <a:cs typeface="Courier New"/>
-                <a:sym typeface="Courier New"/>
-              </a:defRPr>
-            </a:pPr>
-            <a:endParaRPr>
-              <a:latin typeface="Gill Sans MT"/>
-              <a:ea typeface="Gill Sans MT"/>
-              <a:cs typeface="Gill Sans MT"/>
-              <a:sym typeface="Gill Sans MT"/>
-            </a:endParaRPr>
-          </a:p>
-          <a:p>
-            <a:pPr marL="0" indent="0">
-              <a:spcBef>
-                <a:spcPts val="100"/>
-              </a:spcBef>
-              <a:buSzTx/>
-              <a:buNone/>
-              <a:defRPr sz="2800">
-                <a:latin typeface="Courier New"/>
-                <a:ea typeface="Courier New"/>
-                <a:cs typeface="Courier New"/>
-                <a:sym typeface="Courier New"/>
-              </a:defRPr>
-            </a:pPr>
-            <a:endParaRPr>
-              <a:latin typeface="Gill Sans MT"/>
-              <a:ea typeface="Gill Sans MT"/>
-              <a:cs typeface="Gill Sans MT"/>
-              <a:sym typeface="Gill Sans MT"/>
-            </a:endParaRPr>
           </a:p>
         </p:txBody>
       </p:sp>
@@ -4921,150 +4873,6 @@
                       </p:childTnLst>
                     </p:cTn>
                   </p:par>
-                  <p:par>
-                    <p:cTn id="57" fill="hold">
-                      <p:stCondLst>
-                        <p:cond delay="indefinite"/>
-                      </p:stCondLst>
-                      <p:childTnLst>
-                        <p:par>
-                          <p:cTn id="58" fill="hold">
-                            <p:stCondLst>
-                              <p:cond delay="0"/>
-                            </p:stCondLst>
-                            <p:childTnLst>
-                              <p:par>
-                                <p:cTn id="59" presetClass="entr" nodeType="clickEffect" presetSubtype="0" presetID="1" grpId="1" fill="hold">
-                                  <p:stCondLst>
-                                    <p:cond delay="0"/>
-                                  </p:stCondLst>
-                                  <p:iterate type="el" backwards="0">
-                                    <p:tmAbs val="0"/>
-                                  </p:iterate>
-                                  <p:childTnLst>
-                                    <p:set>
-                                      <p:cBhvr>
-                                        <p:cTn id="60" fill="hold"/>
-                                        <p:tgtEl>
-                                          <p:spTgt spid="102">
-                                            <p:txEl>
-                                              <p:pRg st="13" end="13"/>
-                                            </p:txEl>
-                                          </p:spTgt>
-                                        </p:tgtEl>
-                                        <p:attrNameLst>
-                                          <p:attrName>style.visibility</p:attrName>
-                                        </p:attrNameLst>
-                                      </p:cBhvr>
-                                      <p:to>
-                                        <p:strVal val="visible"/>
-                                      </p:to>
-                                    </p:set>
-                                  </p:childTnLst>
-                                </p:cTn>
-                              </p:par>
-                            </p:childTnLst>
-                          </p:cTn>
-                        </p:par>
-                      </p:childTnLst>
-                    </p:cTn>
-                  </p:par>
-                  <p:par>
-                    <p:cTn id="61" fill="hold">
-                      <p:stCondLst>
-                        <p:cond delay="indefinite"/>
-                      </p:stCondLst>
-                      <p:childTnLst>
-                        <p:par>
-                          <p:cTn id="62" fill="hold">
-                            <p:stCondLst>
-                              <p:cond delay="0"/>
-                            </p:stCondLst>
-                            <p:childTnLst>
-                              <p:par>
-                                <p:cTn id="63" presetClass="entr" nodeType="clickEffect" presetSubtype="0" presetID="1" grpId="1" fill="hold">
-                                  <p:stCondLst>
-                                    <p:cond delay="0"/>
-                                  </p:stCondLst>
-                                  <p:iterate type="el" backwards="0">
-                                    <p:tmAbs val="0"/>
-                                  </p:iterate>
-                                  <p:childTnLst>
-                                    <p:set>
-                                      <p:cBhvr>
-                                        <p:cTn id="64" fill="hold"/>
-                                        <p:tgtEl>
-                                          <p:spTgt spid="102">
-                                            <p:txEl>
-                                              <p:pRg st="14" end="14"/>
-                                            </p:txEl>
-                                          </p:spTgt>
-                                        </p:tgtEl>
-                                        <p:attrNameLst>
-                                          <p:attrName>style.visibility</p:attrName>
-                                        </p:attrNameLst>
-                                      </p:cBhvr>
-                                      <p:to>
-                                        <p:strVal val="visible"/>
-                                      </p:to>
-                                    </p:set>
-                                  </p:childTnLst>
-                                </p:cTn>
-                              </p:par>
-                            </p:childTnLst>
-                          </p:cTn>
-                        </p:par>
-                      </p:childTnLst>
-                    </p:cTn>
-                  </p:par>
-                  <p:par>
-                    <p:cTn id="65" fill="hold">
-                      <p:stCondLst>
-                        <p:cond delay="indefinite"/>
-                      </p:stCondLst>
-                      <p:childTnLst>
-                        <p:par>
-                          <p:cTn id="66" fill="hold">
-                            <p:stCondLst>
-                              <p:cond delay="0"/>
-                            </p:stCondLst>
-                            <p:childTnLst>
-                              <p:par>
-                                <p:cTn id="67" presetClass="entr" nodeType="clickEffect" presetSubtype="0" presetID="1" grpId="1" fill="hold">
-                                  <p:stCondLst>
-                                    <p:cond delay="0"/>
-                                  </p:stCondLst>
-                                  <p:iterate type="el" backwards="0">
-                                    <p:tmAbs val="0"/>
-                                  </p:iterate>
-                                  <p:childTnLst>
-                                    <p:set>
-                                      <p:cBhvr>
-                                        <p:cTn id="68" fill="hold"/>
-                                        <p:tgtEl>
-                                          <p:spTgt spid="102">
-                                            <p:txEl>
-                                              <p:pRg st="15" end="15"/>
-                                            </p:txEl>
-                                          </p:spTgt>
-                                        </p:tgtEl>
-                                        <p:attrNameLst>
-                                          <p:attrName>style.visibility</p:attrName>
-                                        </p:attrNameLst>
-                                      </p:cBhvr>
-                                      <p:to>
-                                        <p:strVal val="visible"/>
-                                      </p:to>
-                                    </p:set>
-                                  </p:childTnLst>
-                                </p:cTn>
-                              </p:par>
-                            </p:childTnLst>
-                          </p:cTn>
-                        </p:par>
-                      </p:childTnLst>
-                    </p:cTn>
-                  </p:par>
                 </p:childTnLst>
               </p:cTn>
               <p:prevCondLst>
@@ -5391,7 +5199,7 @@
         </p:nvSpPr>
         <p:spPr>
           <a:xfrm>
-            <a:off x="2387039" y="4575896"/>
+            <a:off x="2387039" y="4575895"/>
             <a:ext cx="5830322" cy="1072704"/>
           </a:xfrm>
           <a:prstGeom prst="rect">
@@ -6539,6 +6347,50 @@
                       </p:childTnLst>
                     </p:cTn>
                   </p:par>
+                  <p:par>
+                    <p:cTn id="33" fill="hold">
+                      <p:stCondLst>
+                        <p:cond delay="indefinite"/>
+                      </p:stCondLst>
+                      <p:childTnLst>
+                        <p:par>
+                          <p:cTn id="34" fill="hold">
+                            <p:stCondLst>
+                              <p:cond delay="0"/>
+                            </p:stCondLst>
+                            <p:childTnLst>
+                              <p:par>
+                                <p:cTn id="35" presetClass="entr" nodeType="clickEffect" presetSubtype="0" presetID="1" grpId="2" fill="hold">
+                                  <p:stCondLst>
+                                    <p:cond delay="0"/>
+                                  </p:stCondLst>
+                                  <p:iterate type="el" backwards="0">
+                                    <p:tmAbs val="0"/>
+                                  </p:iterate>
+                                  <p:childTnLst>
+                                    <p:set>
+                                      <p:cBhvr>
+                                        <p:cTn id="36" fill="hold"/>
+                                        <p:tgtEl>
+                                          <p:spTgt spid="112"/>
+                                        </p:tgtEl>
+                                        <p:attrNameLst>
+                                          <p:attrName>style.visibility</p:attrName>
+                                        </p:attrNameLst>
+                                      </p:cBhvr>
+                                      <p:to>
+                                        <p:strVal val="visible"/>
+                                      </p:to>
+                                    </p:set>
+                                  </p:childTnLst>
+                                </p:cTn>
+                              </p:par>
+                            </p:childTnLst>
+                          </p:cTn>
+                        </p:par>
+                      </p:childTnLst>
+                    </p:cTn>
+                  </p:par>
                 </p:childTnLst>
               </p:cTn>
               <p:prevCondLst>
@@ -6561,6 +6413,7 @@
       </p:par>
     </p:tnLst>
     <p:bldLst>
+      <p:bldP build="whole" bldLvl="1" animBg="1" rev="0" advAuto="0" spid="112" grpId="2"/>
       <p:bldP build="p" bldLvl="5" animBg="1" rev="0" advAuto="0" spid="108" grpId="1"/>
     </p:bldLst>
   </p:timing>
@@ -7874,7 +7727,7 @@
         <p:spPr>
           <a:xfrm>
             <a:off x="6606133" y="2086125"/>
-            <a:ext cx="696080" cy="661893"/>
+            <a:ext cx="696081" cy="661893"/>
           </a:xfrm>
           <a:prstGeom prst="ellipse">
             <a:avLst/>
@@ -8033,8 +7886,8 @@
         </p:nvSpPr>
         <p:spPr>
           <a:xfrm>
-            <a:off x="3390809" y="2086125"/>
-            <a:ext cx="696081" cy="661893"/>
+            <a:off x="3390810" y="2086125"/>
+            <a:ext cx="696080" cy="661893"/>
           </a:xfrm>
           <a:prstGeom prst="ellipse">
             <a:avLst/>
@@ -8996,7 +8849,7 @@
         <p:spPr>
           <a:xfrm>
             <a:off x="1759383" y="2835482"/>
-            <a:ext cx="3001981" cy="1"/>
+            <a:ext cx="3001980" cy="1"/>
           </a:xfrm>
           <a:prstGeom prst="line">
             <a:avLst/>
@@ -9024,7 +8877,7 @@
         <p:spPr>
           <a:xfrm>
             <a:off x="5203223" y="2835482"/>
-            <a:ext cx="3001981" cy="1"/>
+            <a:ext cx="3001980" cy="1"/>
           </a:xfrm>
           <a:prstGeom prst="line">
             <a:avLst/>
@@ -9108,7 +8961,7 @@
         </p:nvSpPr>
         <p:spPr>
           <a:xfrm>
-            <a:off x="1055741" y="5116425"/>
+            <a:off x="1055741" y="5116424"/>
             <a:ext cx="688341" cy="431553"/>
           </a:xfrm>
           <a:prstGeom prst="rect">
@@ -9274,7 +9127,7 @@
         </p:nvSpPr>
         <p:spPr>
           <a:xfrm>
-            <a:off x="5250733" y="5116425"/>
+            <a:off x="5250733" y="5116424"/>
             <a:ext cx="840741" cy="431553"/>
           </a:xfrm>
           <a:prstGeom prst="rect">
@@ -9689,8 +9542,8 @@
         </p:nvSpPr>
         <p:spPr>
           <a:xfrm flipV="1">
-            <a:off x="1956154" y="4828917"/>
-            <a:ext cx="323984" cy="1182125"/>
+            <a:off x="1956154" y="4828918"/>
+            <a:ext cx="323984" cy="1182124"/>
           </a:xfrm>
           <a:prstGeom prst="line">
             <a:avLst/>
@@ -11293,35 +11146,35 @@
     </p:tnLst>
     <p:bldLst>
       <p:bldP build="whole" bldLvl="1" animBg="1" rev="0" advAuto="0" spid="165" grpId="26"/>
+      <p:bldP build="whole" bldLvl="1" animBg="1" rev="0" advAuto="0" spid="168" grpId="14"/>
+      <p:bldP build="whole" bldLvl="1" animBg="1" rev="0" advAuto="0" spid="157" grpId="17"/>
+      <p:bldP build="whole" bldLvl="1" animBg="1" rev="0" advAuto="0" spid="170" grpId="27"/>
+      <p:bldP build="whole" bldLvl="1" animBg="1" rev="0" advAuto="0" spid="156" grpId="1"/>
+      <p:bldP build="whole" bldLvl="1" animBg="1" rev="0" advAuto="0" spid="155" grpId="5"/>
+      <p:bldP build="whole" bldLvl="1" animBg="1" rev="0" advAuto="0" spid="147" grpId="9"/>
+      <p:bldP build="whole" bldLvl="1" animBg="1" rev="0" advAuto="0" spid="164" grpId="21"/>
+      <p:bldP build="whole" bldLvl="1" animBg="1" rev="0" advAuto="0" spid="161" grpId="13"/>
+      <p:bldP build="whole" bldLvl="1" animBg="1" rev="0" advAuto="0" spid="141" grpId="18"/>
+      <p:bldP build="whole" bldLvl="1" animBg="1" rev="0" advAuto="0" spid="179" grpId="19"/>
+      <p:bldP build="whole" bldLvl="1" animBg="1" rev="0" advAuto="0" spid="173" grpId="2"/>
+      <p:bldP build="whole" bldLvl="1" animBg="1" rev="0" advAuto="0" spid="153" grpId="24"/>
+      <p:bldP build="whole" bldLvl="1" animBg="1" rev="0" advAuto="0" spid="174" grpId="6"/>
+      <p:bldP build="whole" bldLvl="1" animBg="1" rev="0" advAuto="0" spid="166" grpId="25"/>
+      <p:bldP build="whole" bldLvl="1" animBg="1" rev="0" advAuto="0" spid="162" grpId="12"/>
+      <p:bldP build="whole" bldLvl="1" animBg="1" rev="0" advAuto="0" spid="136" grpId="3"/>
+      <p:bldP build="whole" bldLvl="1" animBg="1" rev="0" advAuto="0" spid="163" grpId="22"/>
+      <p:bldP build="whole" bldLvl="1" animBg="1" rev="0" advAuto="0" spid="154" grpId="4"/>
+      <p:bldP build="whole" bldLvl="1" animBg="1" rev="0" advAuto="0" spid="182" grpId="23"/>
+      <p:bldP build="whole" bldLvl="1" animBg="1" rev="0" advAuto="0" spid="159" grpId="11"/>
       <p:bldP build="whole" bldLvl="1" animBg="1" rev="0" advAuto="0" spid="175" grpId="8"/>
-      <p:bldP build="whole" bldLvl="1" animBg="1" rev="0" advAuto="0" spid="173" grpId="2"/>
+      <p:bldP build="whole" bldLvl="1" animBg="1" rev="0" advAuto="0" spid="160" grpId="10"/>
+      <p:bldP build="whole" bldLvl="1" animBg="1" rev="0" advAuto="0" spid="176" grpId="16"/>
+      <p:bldP build="whole" bldLvl="1" animBg="1" rev="0" advAuto="0" spid="144" grpId="7"/>
+      <p:bldP build="whole" bldLvl="1" animBg="1" rev="0" advAuto="0" spid="167" grpId="15"/>
+      <p:bldP build="whole" bldLvl="1" animBg="1" rev="0" advAuto="0" spid="169" grpId="28"/>
+      <p:bldP build="whole" bldLvl="1" animBg="1" rev="0" advAuto="0" spid="171" grpId="30"/>
+      <p:bldP build="whole" bldLvl="1" animBg="1" rev="0" advAuto="0" spid="150" grpId="20"/>
       <p:bldP build="whole" bldLvl="1" animBg="1" rev="0" advAuto="0" spid="172" grpId="29"/>
-      <p:bldP build="whole" bldLvl="1" animBg="1" rev="0" advAuto="0" spid="171" grpId="30"/>
-      <p:bldP build="whole" bldLvl="1" animBg="1" rev="0" advAuto="0" spid="161" grpId="13"/>
-      <p:bldP build="whole" bldLvl="1" animBg="1" rev="0" advAuto="0" spid="154" grpId="4"/>
-      <p:bldP build="whole" bldLvl="1" animBg="1" rev="0" advAuto="0" spid="170" grpId="27"/>
-      <p:bldP build="whole" bldLvl="1" animBg="1" rev="0" advAuto="0" spid="167" grpId="15"/>
-      <p:bldP build="whole" bldLvl="1" animBg="1" rev="0" advAuto="0" spid="162" grpId="12"/>
-      <p:bldP build="whole" bldLvl="1" animBg="1" rev="0" advAuto="0" spid="168" grpId="14"/>
-      <p:bldP build="whole" bldLvl="1" animBg="1" rev="0" advAuto="0" spid="159" grpId="11"/>
-      <p:bldP build="whole" bldLvl="1" animBg="1" rev="0" advAuto="0" spid="166" grpId="25"/>
-      <p:bldP build="whole" bldLvl="1" animBg="1" rev="0" advAuto="0" spid="144" grpId="7"/>
-      <p:bldP build="whole" bldLvl="1" animBg="1" rev="0" advAuto="0" spid="136" grpId="3"/>
-      <p:bldP build="whole" bldLvl="1" animBg="1" rev="0" advAuto="0" spid="174" grpId="6"/>
-      <p:bldP build="whole" bldLvl="1" animBg="1" rev="0" advAuto="0" spid="164" grpId="21"/>
-      <p:bldP build="whole" bldLvl="1" animBg="1" rev="0" advAuto="0" spid="179" grpId="19"/>
-      <p:bldP build="whole" bldLvl="1" animBg="1" rev="0" advAuto="0" spid="150" grpId="20"/>
-      <p:bldP build="whole" bldLvl="1" animBg="1" rev="0" advAuto="0" spid="163" grpId="22"/>
-      <p:bldP build="whole" bldLvl="1" animBg="1" rev="0" advAuto="0" spid="182" grpId="23"/>
-      <p:bldP build="whole" bldLvl="1" animBg="1" rev="0" advAuto="0" spid="153" grpId="24"/>
-      <p:bldP build="whole" bldLvl="1" animBg="1" rev="0" advAuto="0" spid="169" grpId="28"/>
-      <p:bldP build="whole" bldLvl="1" animBg="1" rev="0" advAuto="0" spid="147" grpId="9"/>
-      <p:bldP build="whole" bldLvl="1" animBg="1" rev="0" advAuto="0" spid="176" grpId="16"/>
-      <p:bldP build="whole" bldLvl="1" animBg="1" rev="0" advAuto="0" spid="155" grpId="5"/>
-      <p:bldP build="whole" bldLvl="1" animBg="1" rev="0" advAuto="0" spid="160" grpId="10"/>
-      <p:bldP build="whole" bldLvl="1" animBg="1" rev="0" advAuto="0" spid="156" grpId="1"/>
-      <p:bldP build="whole" bldLvl="1" animBg="1" rev="0" advAuto="0" spid="157" grpId="17"/>
-      <p:bldP build="whole" bldLvl="1" animBg="1" rev="0" advAuto="0" spid="141" grpId="18"/>
     </p:bldLst>
   </p:timing>
 </p:sld>
@@ -11395,7 +11248,31 @@
               </a:spcBef>
             </a:pPr>
             <a:r>
-              <a:t>Consider when comparison of indices i and j are of equal cost to that comparing elements.</a:t>
+              <a:t>Consider when comparison of indices </a:t>
+            </a:r>
+            <a:r>
+              <a:rPr>
+                <a:latin typeface="Courier New"/>
+                <a:ea typeface="Courier New"/>
+                <a:cs typeface="Courier New"/>
+                <a:sym typeface="Courier New"/>
+              </a:rPr>
+              <a:t>i</a:t>
+            </a:r>
+            <a:r>
+              <a:t> and </a:t>
+            </a:r>
+            <a:r>
+              <a:rPr>
+                <a:latin typeface="Courier New"/>
+                <a:ea typeface="Courier New"/>
+                <a:cs typeface="Courier New"/>
+                <a:sym typeface="Courier New"/>
+              </a:rPr>
+              <a:t>j</a:t>
+            </a:r>
+            <a:r>
+              <a:t> are of equal cost to that comparing elements.</a:t>
             </a:r>
           </a:p>
           <a:p>
@@ -11453,7 +11330,7 @@
               </a:defRPr>
             </a:pPr>
             <a:r>
-              <a:t>Cn = 2</a:t>
+              <a:t>C(n) = 2</a:t>
             </a:r>
           </a:p>
           <a:p>
@@ -11481,7 +11358,7 @@
               </a:defRPr>
             </a:pPr>
             <a:r>
-              <a:t>Cn=2C(n/2)+3</a:t>
+              <a:t>C(n)=2C(n/2)+3</a:t>
             </a:r>
           </a:p>
           <a:p>
@@ -12567,7 +12444,7 @@
       </p:sp>
       <p:sp>
         <p:nvSpPr>
-          <p:cNvPr id="191" name="When elements comparison much more costly than integer comparison (loop variables)…"/>
+          <p:cNvPr id="191" name="When elements comparison is much more costly than integer comparison (loop variables)…"/>
           <p:cNvSpPr txBox="1"/>
           <p:nvPr>
             <p:ph type="body" idx="1"/>
@@ -12584,7 +12461,7 @@
           <a:p>
             <a:pPr/>
             <a:r>
-              <a:t>When elements comparison much more costly than integer comparison (loop variables)</a:t>
+              <a:t>When elements comparison is much more costly than integer comparison (loop variables)</a:t>
             </a:r>
           </a:p>
           <a:p>
@@ -12608,13 +12485,13 @@
           <a:p>
             <a:pPr/>
             <a:r>
-              <a:t>Use Divide and Conquer as a guide to better algorithm, </a:t>
+              <a:t>Use Divide and Conquer as a guide to develop better algorithm, </a:t>
             </a:r>
           </a:p>
           <a:p>
             <a:pPr lvl="1"/>
             <a:r>
-              <a:t>but not necessarily always.</a:t>
+              <a:t>but it is not necessarily true always.</a:t>
             </a:r>
           </a:p>
         </p:txBody>
@@ -13588,7 +13465,7 @@
               </a:spcBef>
             </a:pPr>
             <a:r>
-              <a:t>Optimization ot Naive approach</a:t>
+              <a:t>Optimization to Naive approach</a:t>
             </a:r>
           </a:p>
           <a:p>
@@ -14498,7 +14375,9 @@
             </a:r>
           </a:p>
           <a:p>
-            <a:pPr lvl="1"/>
+            <a:pPr lvl="1" marL="663178" indent="-267890">
+              <a:buChar char="•"/>
+            </a:pPr>
             <a:r>
               <a:rPr>
                 <a:latin typeface="Courier New"/>
@@ -14513,7 +14392,9 @@
             </a:r>
           </a:p>
           <a:p>
-            <a:pPr lvl="1"/>
+            <a:pPr lvl="1" marL="663178" indent="-267890">
+              <a:buChar char="•"/>
+            </a:pPr>
             <a:r>
               <a:rPr>
                 <a:latin typeface="Courier New"/>
@@ -14528,7 +14409,8 @@
             </a:r>
           </a:p>
           <a:p>
-            <a:pPr lvl="1">
+            <a:pPr lvl="1" marL="663178" indent="-267890">
+              <a:buChar char="•"/>
               <a:defRPr>
                 <a:latin typeface="Courier New"/>
                 <a:ea typeface="Courier New"/>
@@ -15379,7 +15261,9 @@
             </a:r>
           </a:p>
           <a:p>
-            <a:pPr lvl="1"/>
+            <a:pPr lvl="1" marL="663178" indent="-267890">
+              <a:buChar char="•"/>
+            </a:pPr>
             <a:r>
               <a:rPr>
                 <a:latin typeface="Courier New"/>
@@ -15394,7 +15278,9 @@
             </a:r>
           </a:p>
           <a:p>
-            <a:pPr lvl="1"/>
+            <a:pPr lvl="1" marL="663178" indent="-267890">
+              <a:buChar char="•"/>
+            </a:pPr>
             <a:r>
               <a:rPr>
                 <a:latin typeface="Courier New"/>
@@ -15409,7 +15295,8 @@
             </a:r>
           </a:p>
           <a:p>
-            <a:pPr lvl="1">
+            <a:pPr lvl="1" marL="663178" indent="-267890">
+              <a:buChar char="•"/>
               <a:defRPr>
                 <a:latin typeface="Courier New"/>
                 <a:ea typeface="Courier New"/>
@@ -16338,10 +16225,11 @@
             </a:r>
           </a:p>
           <a:p>
-            <a:pPr lvl="1">
+            <a:pPr lvl="1" marL="663178" indent="-267890">
               <a:spcBef>
                 <a:spcPts val="300"/>
               </a:spcBef>
+              <a:buChar char="•"/>
             </a:pPr>
             <a:r>
               <a:rPr>
@@ -16357,10 +16245,11 @@
             </a:r>
           </a:p>
           <a:p>
-            <a:pPr lvl="1">
+            <a:pPr lvl="1" marL="663178" indent="-267890">
               <a:spcBef>
                 <a:spcPts val="300"/>
               </a:spcBef>
+              <a:buChar char="•"/>
             </a:pPr>
             <a:r>
               <a:rPr>
@@ -16376,10 +16265,11 @@
             </a:r>
           </a:p>
           <a:p>
-            <a:pPr lvl="1">
+            <a:pPr lvl="1" marL="663178" indent="-267890">
               <a:spcBef>
                 <a:spcPts val="300"/>
               </a:spcBef>
+              <a:buChar char="•"/>
               <a:defRPr>
                 <a:latin typeface="Courier New"/>
                 <a:ea typeface="Courier New"/>
@@ -18268,13 +18158,27 @@
           <a:p>
             <a:pPr lvl="1"/>
             <a:r>
-              <a:t>Comparison of Min always succeeds</a:t>
+              <a:t>Comparison of </a:t>
+            </a:r>
+            <a:r>
+              <a:rPr b="1"/>
+              <a:t>Min</a:t>
+            </a:r>
+            <a:r>
+              <a:t> always succeeds</a:t>
             </a:r>
           </a:p>
           <a:p>
             <a:pPr lvl="1"/>
             <a:r>
-              <a:t>Comparison of Max never occurs</a:t>
+              <a:t>Comparison of </a:t>
+            </a:r>
+            <a:r>
+              <a:rPr b="1"/>
+              <a:t>Max</a:t>
+            </a:r>
+            <a:r>
+              <a:t> never occurs</a:t>
             </a:r>
           </a:p>
           <a:p>
@@ -18318,19 +18222,33 @@
           <a:p>
             <a:pPr lvl="1"/>
             <a:r>
-              <a:t>Elements are sorted in ascneding order.</a:t>
+              <a:t>Elements are sorted in ascending order.</a:t>
             </a:r>
           </a:p>
           <a:p>
             <a:pPr lvl="1"/>
             <a:r>
-              <a:t>Comparison of Min always fails</a:t>
+              <a:t>Comparison of </a:t>
+            </a:r>
+            <a:r>
+              <a:rPr b="1"/>
+              <a:t>Min</a:t>
+            </a:r>
+            <a:r>
+              <a:t> always fails</a:t>
             </a:r>
           </a:p>
           <a:p>
             <a:pPr lvl="1"/>
             <a:r>
-              <a:t>Comparison of Max invoked every time</a:t>
+              <a:t>Comparison of </a:t>
+            </a:r>
+            <a:r>
+              <a:rPr b="1"/>
+              <a:t>Max</a:t>
+            </a:r>
+            <a:r>
+              <a:t> invoked every time</a:t>
             </a:r>
           </a:p>
           <a:p>

</xml_diff>